<commit_message>
new CSS html added
</commit_message>
<xml_diff>
--- a/CSS.pptx
+++ b/CSS.pptx
@@ -38,8 +38,8 @@
     <p:sldId id="276" r:id="rId29"/>
     <p:sldId id="277" r:id="rId30"/>
     <p:sldId id="301" r:id="rId31"/>
-    <p:sldId id="282" r:id="rId32"/>
-    <p:sldId id="302" r:id="rId33"/>
+    <p:sldId id="302" r:id="rId32"/>
+    <p:sldId id="282" r:id="rId33"/>
     <p:sldId id="279" r:id="rId34"/>
   </p:sldIdLst>
   <p:sldSz cx="12192000" cy="6858000"/>
@@ -229,7 +229,7 @@
           <a:p>
             <a:fld id="{23516DD8-4FC3-44F9-B0D3-622D9A59BFE1}" type="datetimeFigureOut">
               <a:rPr lang="en-US" smtClean="0"/>
-              <a:t>08-Nov-25</a:t>
+              <a:t>15-Nov-25</a:t>
             </a:fld>
             <a:endParaRPr lang="en-US"/>
           </a:p>
@@ -643,7 +643,7 @@
           <a:p>
             <a:fld id="{A195FBE3-EDB4-440D-A119-5967DD7F6BB4}" type="datetimeFigureOut">
               <a:rPr lang="en-US" smtClean="0"/>
-              <a:t>08-Nov-25</a:t>
+              <a:t>15-Nov-25</a:t>
             </a:fld>
             <a:endParaRPr lang="en-US"/>
           </a:p>
@@ -841,7 +841,7 @@
           <a:p>
             <a:fld id="{A195FBE3-EDB4-440D-A119-5967DD7F6BB4}" type="datetimeFigureOut">
               <a:rPr lang="en-US" smtClean="0"/>
-              <a:t>08-Nov-25</a:t>
+              <a:t>15-Nov-25</a:t>
             </a:fld>
             <a:endParaRPr lang="en-US"/>
           </a:p>
@@ -1049,7 +1049,7 @@
           <a:p>
             <a:fld id="{A195FBE3-EDB4-440D-A119-5967DD7F6BB4}" type="datetimeFigureOut">
               <a:rPr lang="en-US" smtClean="0"/>
-              <a:t>08-Nov-25</a:t>
+              <a:t>15-Nov-25</a:t>
             </a:fld>
             <a:endParaRPr lang="en-US"/>
           </a:p>
@@ -1247,7 +1247,7 @@
           <a:p>
             <a:fld id="{A195FBE3-EDB4-440D-A119-5967DD7F6BB4}" type="datetimeFigureOut">
               <a:rPr lang="en-US" smtClean="0"/>
-              <a:t>08-Nov-25</a:t>
+              <a:t>15-Nov-25</a:t>
             </a:fld>
             <a:endParaRPr lang="en-US"/>
           </a:p>
@@ -1522,7 +1522,7 @@
           <a:p>
             <a:fld id="{A195FBE3-EDB4-440D-A119-5967DD7F6BB4}" type="datetimeFigureOut">
               <a:rPr lang="en-US" smtClean="0"/>
-              <a:t>08-Nov-25</a:t>
+              <a:t>15-Nov-25</a:t>
             </a:fld>
             <a:endParaRPr lang="en-US"/>
           </a:p>
@@ -1787,7 +1787,7 @@
           <a:p>
             <a:fld id="{A195FBE3-EDB4-440D-A119-5967DD7F6BB4}" type="datetimeFigureOut">
               <a:rPr lang="en-US" smtClean="0"/>
-              <a:t>08-Nov-25</a:t>
+              <a:t>15-Nov-25</a:t>
             </a:fld>
             <a:endParaRPr lang="en-US"/>
           </a:p>
@@ -2199,7 +2199,7 @@
           <a:p>
             <a:fld id="{A195FBE3-EDB4-440D-A119-5967DD7F6BB4}" type="datetimeFigureOut">
               <a:rPr lang="en-US" smtClean="0"/>
-              <a:t>08-Nov-25</a:t>
+              <a:t>15-Nov-25</a:t>
             </a:fld>
             <a:endParaRPr lang="en-US"/>
           </a:p>
@@ -2340,7 +2340,7 @@
           <a:p>
             <a:fld id="{A195FBE3-EDB4-440D-A119-5967DD7F6BB4}" type="datetimeFigureOut">
               <a:rPr lang="en-US" smtClean="0"/>
-              <a:t>08-Nov-25</a:t>
+              <a:t>15-Nov-25</a:t>
             </a:fld>
             <a:endParaRPr lang="en-US"/>
           </a:p>
@@ -2453,7 +2453,7 @@
           <a:p>
             <a:fld id="{A195FBE3-EDB4-440D-A119-5967DD7F6BB4}" type="datetimeFigureOut">
               <a:rPr lang="en-US" smtClean="0"/>
-              <a:t>08-Nov-25</a:t>
+              <a:t>15-Nov-25</a:t>
             </a:fld>
             <a:endParaRPr lang="en-US"/>
           </a:p>
@@ -2764,7 +2764,7 @@
           <a:p>
             <a:fld id="{A195FBE3-EDB4-440D-A119-5967DD7F6BB4}" type="datetimeFigureOut">
               <a:rPr lang="en-US" smtClean="0"/>
-              <a:t>08-Nov-25</a:t>
+              <a:t>15-Nov-25</a:t>
             </a:fld>
             <a:endParaRPr lang="en-US"/>
           </a:p>
@@ -3052,7 +3052,7 @@
           <a:p>
             <a:fld id="{A195FBE3-EDB4-440D-A119-5967DD7F6BB4}" type="datetimeFigureOut">
               <a:rPr lang="en-US" smtClean="0"/>
-              <a:t>08-Nov-25</a:t>
+              <a:t>15-Nov-25</a:t>
             </a:fld>
             <a:endParaRPr lang="en-US"/>
           </a:p>
@@ -3293,7 +3293,7 @@
           <a:p>
             <a:fld id="{A195FBE3-EDB4-440D-A119-5967DD7F6BB4}" type="datetimeFigureOut">
               <a:rPr lang="en-US" smtClean="0"/>
-              <a:t>08-Nov-25</a:t>
+              <a:t>15-Nov-25</a:t>
             </a:fld>
             <a:endParaRPr lang="en-US"/>
           </a:p>
@@ -18771,7 +18771,7 @@
           <p:nvPr>
             <p:extLst>
               <p:ext uri="{D42A27DB-BD31-4B8C-83A1-F6EECF244321}">
-                <p14:modId xmlns:p14="http://schemas.microsoft.com/office/powerpoint/2010/main" val="3704084114"/>
+                <p14:modId xmlns:p14="http://schemas.microsoft.com/office/powerpoint/2010/main" val="2081197422"/>
               </p:ext>
             </p:extLst>
           </p:nvPr>
@@ -18787,28 +18787,28 @@
                 <a:tableStyleId>{5C22544A-7EE6-4342-B048-85BDC9FD1C3A}</a:tableStyleId>
               </a:tblPr>
               <a:tblGrid>
-                <a:gridCol w="1741999">
+                <a:gridCol w="1670895">
                   <a:extLst>
                     <a:ext uri="{9D8B030D-6E8A-4147-A177-3AD203B41FA5}">
                       <a16:colId xmlns:a16="http://schemas.microsoft.com/office/drawing/2014/main" val="581144482"/>
                     </a:ext>
                   </a:extLst>
                 </a:gridCol>
-                <a:gridCol w="4096810">
+                <a:gridCol w="4419600">
                   <a:extLst>
                     <a:ext uri="{9D8B030D-6E8A-4147-A177-3AD203B41FA5}">
                       <a16:colId xmlns:a16="http://schemas.microsoft.com/office/drawing/2014/main" val="1495882747"/>
                     </a:ext>
                   </a:extLst>
                 </a:gridCol>
-                <a:gridCol w="2691881">
+                <a:gridCol w="2651760">
                   <a:extLst>
                     <a:ext uri="{9D8B030D-6E8A-4147-A177-3AD203B41FA5}">
                       <a16:colId xmlns:a16="http://schemas.microsoft.com/office/drawing/2014/main" val="3610408656"/>
                     </a:ext>
                   </a:extLst>
                 </a:gridCol>
-                <a:gridCol w="2796861">
+                <a:gridCol w="2585296">
                   <a:extLst>
                     <a:ext uri="{9D8B030D-6E8A-4147-A177-3AD203B41FA5}">
                       <a16:colId xmlns:a16="http://schemas.microsoft.com/office/drawing/2014/main" val="2383528300"/>
@@ -19711,13 +19711,13 @@
                         <a:buNone/>
                       </a:pPr>
                       <a:r>
-                        <a:rPr lang="en-US" sz="1900" b="0">
+                        <a:rPr lang="en-US" sz="1900" b="0" dirty="0">
                           <a:effectLst/>
                           <a:latin typeface="Menlo"/>
                         </a:rPr>
                         <a:t>gap: 1rem;</a:t>
                       </a:r>
-                      <a:endParaRPr lang="en-US" sz="1900" b="0">
+                      <a:endParaRPr lang="en-US" sz="1900" b="0" dirty="0">
                         <a:effectLst/>
                         <a:latin typeface="quote-cjk-patch"/>
                       </a:endParaRPr>
@@ -21764,7 +21764,7 @@
           <a:lstStyle/>
           <a:p>
             <a:r>
-              <a:rPr lang="en-US" sz="4000">
+              <a:rPr lang="en-US" sz="4000" dirty="0">
                 <a:solidFill>
                   <a:srgbClr val="FFFFFF"/>
                 </a:solidFill>
@@ -21790,14 +21790,14 @@
             <p:ph idx="1"/>
             <p:extLst>
               <p:ext uri="{D42A27DB-BD31-4B8C-83A1-F6EECF244321}">
-                <p14:modId xmlns:p14="http://schemas.microsoft.com/office/powerpoint/2010/main" val="1380175980"/>
+                <p14:modId xmlns:p14="http://schemas.microsoft.com/office/powerpoint/2010/main" val="2509087777"/>
               </p:ext>
             </p:extLst>
           </p:nvPr>
         </p:nvGraphicFramePr>
         <p:xfrm>
-          <a:off x="644056" y="2228113"/>
-          <a:ext cx="10927830" cy="3961740"/>
+          <a:off x="325120" y="1924820"/>
+          <a:ext cx="11584968" cy="4401692"/>
         </p:xfrm>
         <a:graphic>
           <a:graphicData uri="http://schemas.openxmlformats.org/drawingml/2006/table">
@@ -21806,28 +21806,28 @@
                 <a:tableStyleId>{5C22544A-7EE6-4342-B048-85BDC9FD1C3A}</a:tableStyleId>
               </a:tblPr>
               <a:tblGrid>
-                <a:gridCol w="1428484">
+                <a:gridCol w="1344043">
                   <a:extLst>
                     <a:ext uri="{9D8B030D-6E8A-4147-A177-3AD203B41FA5}">
                       <a16:colId xmlns:a16="http://schemas.microsoft.com/office/drawing/2014/main" val="3219861325"/>
                     </a:ext>
                   </a:extLst>
                 </a:gridCol>
-                <a:gridCol w="4007060">
+                <a:gridCol w="4430045">
                   <a:extLst>
                     <a:ext uri="{9D8B030D-6E8A-4147-A177-3AD203B41FA5}">
                       <a16:colId xmlns:a16="http://schemas.microsoft.com/office/drawing/2014/main" val="3043856956"/>
                     </a:ext>
                   </a:extLst>
                 </a:gridCol>
-                <a:gridCol w="2170033">
+                <a:gridCol w="2306035">
                   <a:extLst>
                     <a:ext uri="{9D8B030D-6E8A-4147-A177-3AD203B41FA5}">
                       <a16:colId xmlns:a16="http://schemas.microsoft.com/office/drawing/2014/main" val="2476629622"/>
                     </a:ext>
                   </a:extLst>
                 </a:gridCol>
-                <a:gridCol w="3322253">
+                <a:gridCol w="3504845">
                   <a:extLst>
                     <a:ext uri="{9D8B030D-6E8A-4147-A177-3AD203B41FA5}">
                       <a16:colId xmlns:a16="http://schemas.microsoft.com/office/drawing/2014/main" val="2112594218"/>
@@ -21835,7 +21835,7 @@
                   </a:extLst>
                 </a:gridCol>
               </a:tblGrid>
-              <a:tr h="480606">
+              <a:tr h="533978">
                 <a:tc>
                   <a:txBody>
                     <a:bodyPr/>
@@ -21848,7 +21848,7 @@
                         <a:buNone/>
                       </a:pPr>
                       <a:r>
-                        <a:rPr lang="en-US" sz="2000" b="0">
+                        <a:rPr lang="en-US" sz="2000" b="0" dirty="0">
                           <a:effectLst/>
                           <a:latin typeface="quote-cjk-patch"/>
                         </a:rPr>
@@ -21930,7 +21930,7 @@
                   </a:ext>
                 </a:extLst>
               </a:tr>
-              <a:tr h="750132">
+              <a:tr h="833434">
                 <a:tc>
                   <a:txBody>
                     <a:bodyPr/>
@@ -22033,7 +22033,7 @@
                   </a:ext>
                 </a:extLst>
               </a:tr>
-              <a:tr h="750132">
+              <a:tr h="833434">
                 <a:tc>
                   <a:txBody>
                     <a:bodyPr/>
@@ -22136,7 +22136,7 @@
                   </a:ext>
                 </a:extLst>
               </a:tr>
-              <a:tr h="750132">
+              <a:tr h="833434">
                 <a:tc>
                   <a:txBody>
                     <a:bodyPr/>
@@ -22285,7 +22285,7 @@
                   </a:ext>
                 </a:extLst>
               </a:tr>
-              <a:tr h="750132">
+              <a:tr h="833434">
                 <a:tc>
                   <a:txBody>
                     <a:bodyPr/>
@@ -22388,7 +22388,7 @@
                   </a:ext>
                 </a:extLst>
               </a:tr>
-              <a:tr h="480606">
+              <a:tr h="533978">
                 <a:tc>
                   <a:txBody>
                     <a:bodyPr/>
@@ -27287,6 +27287,540 @@
         <p:cNvPr id="1" name="">
           <a:extLst>
             <a:ext uri="{FF2B5EF4-FFF2-40B4-BE49-F238E27FC236}">
+              <a16:creationId xmlns:a16="http://schemas.microsoft.com/office/drawing/2014/main" id="{C75C18E4-79BB-4DDA-9CAD-AAC1CEA36C49}"/>
+            </a:ext>
+          </a:extLst>
+        </p:cNvPr>
+        <p:cNvGrpSpPr/>
+        <p:nvPr/>
+      </p:nvGrpSpPr>
+      <p:grpSpPr>
+        <a:xfrm>
+          <a:off x="0" y="0"/>
+          <a:ext cx="0" cy="0"/>
+          <a:chOff x="0" y="0"/>
+          <a:chExt cx="0" cy="0"/>
+        </a:xfrm>
+      </p:grpSpPr>
+      <p:sp useBgFill="1">
+        <p:nvSpPr>
+          <p:cNvPr id="25" name="Rectangle 24">
+            <a:extLst>
+              <a:ext uri="{FF2B5EF4-FFF2-40B4-BE49-F238E27FC236}">
+                <a16:creationId xmlns:a16="http://schemas.microsoft.com/office/drawing/2014/main" id="{E12D2DBC-999A-DEC6-C290-BB02B5A01CFD}"/>
+              </a:ext>
+              <a:ext uri="{C183D7F6-B498-43B3-948B-1728B52AA6E4}">
+                <adec:decorative xmlns:adec="http://schemas.microsoft.com/office/drawing/2017/decorative" val="1"/>
+              </a:ext>
+            </a:extLst>
+          </p:cNvPr>
+          <p:cNvSpPr>
+            <a:spLocks noGrp="1" noRot="1" noChangeAspect="1" noMove="1" noResize="1" noEditPoints="1" noAdjustHandles="1" noChangeArrowheads="1" noChangeShapeType="1" noTextEdit="1"/>
+          </p:cNvSpPr>
+          <p:nvPr>
+            <p:extLst>
+              <p:ext uri="{386F3935-93C4-4BCD-93E2-E3B085C9AB24}">
+                <p16:designElem xmlns:p16="http://schemas.microsoft.com/office/powerpoint/2015/main" val="1"/>
+              </p:ext>
+            </p:extLst>
+          </p:nvPr>
+        </p:nvSpPr>
+        <p:spPr>
+          <a:xfrm>
+            <a:off x="0" y="0"/>
+            <a:ext cx="12192000" cy="6858000"/>
+          </a:xfrm>
+          <a:prstGeom prst="rect">
+            <a:avLst/>
+          </a:prstGeom>
+          <a:ln w="12700" cap="flat" cmpd="sng" algn="ctr">
+            <a:noFill/>
+            <a:prstDash val="solid"/>
+            <a:miter lim="800000"/>
+          </a:ln>
+          <a:effectLst/>
+          <a:extLst>
+            <a:ext uri="{91240B29-F687-4F45-9708-019B960494DF}">
+              <a14:hiddenLine xmlns:a14="http://schemas.microsoft.com/office/drawing/2010/main" w="12700" cap="flat" cmpd="sng" algn="ctr">
+                <a:solidFill>
+                  <a:schemeClr val="accent1">
+                    <a:shade val="50000"/>
+                  </a:schemeClr>
+                </a:solidFill>
+                <a:prstDash val="solid"/>
+                <a:miter lim="800000"/>
+              </a14:hiddenLine>
+            </a:ext>
+          </a:extLst>
+        </p:spPr>
+        <p:style>
+          <a:lnRef idx="2">
+            <a:schemeClr val="accent1">
+              <a:shade val="50000"/>
+            </a:schemeClr>
+          </a:lnRef>
+          <a:fillRef idx="1">
+            <a:schemeClr val="accent1"/>
+          </a:fillRef>
+          <a:effectRef idx="0">
+            <a:schemeClr val="accent1"/>
+          </a:effectRef>
+          <a:fontRef idx="minor">
+            <a:schemeClr val="lt1"/>
+          </a:fontRef>
+        </p:style>
+        <p:txBody>
+          <a:bodyPr rtlCol="0" anchor="ctr"/>
+          <a:lstStyle/>
+          <a:p>
+            <a:pPr algn="ctr"/>
+            <a:endParaRPr lang="en-US"/>
+          </a:p>
+        </p:txBody>
+      </p:sp>
+      <p:sp>
+        <p:nvSpPr>
+          <p:cNvPr id="27" name="Rectangle 26">
+            <a:extLst>
+              <a:ext uri="{FF2B5EF4-FFF2-40B4-BE49-F238E27FC236}">
+                <a16:creationId xmlns:a16="http://schemas.microsoft.com/office/drawing/2014/main" id="{3829E176-5C6C-0547-5305-463A623D15DC}"/>
+              </a:ext>
+              <a:ext uri="{C183D7F6-B498-43B3-948B-1728B52AA6E4}">
+                <adec:decorative xmlns:adec="http://schemas.microsoft.com/office/drawing/2017/decorative" val="1"/>
+              </a:ext>
+            </a:extLst>
+          </p:cNvPr>
+          <p:cNvSpPr>
+            <a:spLocks noGrp="1" noRot="1" noChangeAspect="1" noMove="1" noResize="1" noEditPoints="1" noAdjustHandles="1" noChangeArrowheads="1" noChangeShapeType="1" noTextEdit="1"/>
+          </p:cNvSpPr>
+          <p:nvPr>
+            <p:extLst>
+              <p:ext uri="{386F3935-93C4-4BCD-93E2-E3B085C9AB24}">
+                <p16:designElem xmlns:p16="http://schemas.microsoft.com/office/powerpoint/2015/main" val="1"/>
+              </p:ext>
+            </p:extLst>
+          </p:nvPr>
+        </p:nvSpPr>
+        <p:spPr>
+          <a:xfrm flipH="1">
+            <a:off x="-1" y="-1"/>
+            <a:ext cx="12191998" cy="1590742"/>
+          </a:xfrm>
+          <a:prstGeom prst="rect">
+            <a:avLst/>
+          </a:prstGeom>
+          <a:gradFill>
+            <a:gsLst>
+              <a:gs pos="0">
+                <a:srgbClr val="000000"/>
+              </a:gs>
+              <a:gs pos="100000">
+                <a:schemeClr val="accent1">
+                  <a:lumMod val="75000"/>
+                </a:schemeClr>
+              </a:gs>
+            </a:gsLst>
+            <a:lin ang="8400000" scaled="0"/>
+          </a:gradFill>
+          <a:ln>
+            <a:noFill/>
+          </a:ln>
+        </p:spPr>
+        <p:style>
+          <a:lnRef idx="2">
+            <a:schemeClr val="accent1">
+              <a:shade val="50000"/>
+            </a:schemeClr>
+          </a:lnRef>
+          <a:fillRef idx="1">
+            <a:schemeClr val="accent1"/>
+          </a:fillRef>
+          <a:effectRef idx="0">
+            <a:schemeClr val="accent1"/>
+          </a:effectRef>
+          <a:fontRef idx="minor">
+            <a:schemeClr val="lt1"/>
+          </a:fontRef>
+        </p:style>
+        <p:txBody>
+          <a:bodyPr rtlCol="0" anchor="ctr"/>
+          <a:lstStyle/>
+          <a:p>
+            <a:pPr algn="ctr"/>
+            <a:endParaRPr lang="en-US"/>
+          </a:p>
+        </p:txBody>
+      </p:sp>
+      <p:sp>
+        <p:nvSpPr>
+          <p:cNvPr id="29" name="Rectangle 28">
+            <a:extLst>
+              <a:ext uri="{FF2B5EF4-FFF2-40B4-BE49-F238E27FC236}">
+                <a16:creationId xmlns:a16="http://schemas.microsoft.com/office/drawing/2014/main" id="{BC9A17F4-79B9-E455-971E-392B53A0EF44}"/>
+              </a:ext>
+              <a:ext uri="{C183D7F6-B498-43B3-948B-1728B52AA6E4}">
+                <adec:decorative xmlns:adec="http://schemas.microsoft.com/office/drawing/2017/decorative" val="1"/>
+              </a:ext>
+            </a:extLst>
+          </p:cNvPr>
+          <p:cNvSpPr>
+            <a:spLocks noGrp="1" noRot="1" noChangeAspect="1" noMove="1" noResize="1" noEditPoints="1" noAdjustHandles="1" noChangeArrowheads="1" noChangeShapeType="1" noTextEdit="1"/>
+          </p:cNvSpPr>
+          <p:nvPr>
+            <p:extLst>
+              <p:ext uri="{386F3935-93C4-4BCD-93E2-E3B085C9AB24}">
+                <p16:designElem xmlns:p16="http://schemas.microsoft.com/office/powerpoint/2015/main" val="1"/>
+              </p:ext>
+            </p:extLst>
+          </p:nvPr>
+        </p:nvSpPr>
+        <p:spPr>
+          <a:xfrm rot="10800000" flipH="1">
+            <a:off x="-3" y="0"/>
+            <a:ext cx="8115306" cy="1590742"/>
+          </a:xfrm>
+          <a:prstGeom prst="rect">
+            <a:avLst/>
+          </a:prstGeom>
+          <a:gradFill>
+            <a:gsLst>
+              <a:gs pos="20000">
+                <a:schemeClr val="accent1">
+                  <a:alpha val="0"/>
+                </a:schemeClr>
+              </a:gs>
+              <a:gs pos="100000">
+                <a:schemeClr val="accent1">
+                  <a:lumMod val="50000"/>
+                  <a:alpha val="55000"/>
+                </a:schemeClr>
+              </a:gs>
+            </a:gsLst>
+            <a:lin ang="13800000" scaled="0"/>
+          </a:gradFill>
+          <a:ln>
+            <a:noFill/>
+          </a:ln>
+        </p:spPr>
+        <p:style>
+          <a:lnRef idx="2">
+            <a:schemeClr val="accent1">
+              <a:shade val="50000"/>
+            </a:schemeClr>
+          </a:lnRef>
+          <a:fillRef idx="1">
+            <a:schemeClr val="accent1"/>
+          </a:fillRef>
+          <a:effectRef idx="0">
+            <a:schemeClr val="accent1"/>
+          </a:effectRef>
+          <a:fontRef idx="minor">
+            <a:schemeClr val="lt1"/>
+          </a:fontRef>
+        </p:style>
+        <p:txBody>
+          <a:bodyPr rtlCol="0" anchor="ctr"/>
+          <a:lstStyle/>
+          <a:p>
+            <a:pPr algn="ctr"/>
+            <a:endParaRPr lang="en-US"/>
+          </a:p>
+        </p:txBody>
+      </p:sp>
+      <p:sp>
+        <p:nvSpPr>
+          <p:cNvPr id="31" name="Rectangle 30">
+            <a:extLst>
+              <a:ext uri="{FF2B5EF4-FFF2-40B4-BE49-F238E27FC236}">
+                <a16:creationId xmlns:a16="http://schemas.microsoft.com/office/drawing/2014/main" id="{881310BF-1672-C549-0587-7AB9CF5421B1}"/>
+              </a:ext>
+              <a:ext uri="{C183D7F6-B498-43B3-948B-1728B52AA6E4}">
+                <adec:decorative xmlns:adec="http://schemas.microsoft.com/office/drawing/2017/decorative" val="1"/>
+              </a:ext>
+            </a:extLst>
+          </p:cNvPr>
+          <p:cNvSpPr>
+            <a:spLocks noGrp="1" noRot="1" noChangeAspect="1" noMove="1" noResize="1" noEditPoints="1" noAdjustHandles="1" noChangeArrowheads="1" noChangeShapeType="1" noTextEdit="1"/>
+          </p:cNvSpPr>
+          <p:nvPr>
+            <p:extLst>
+              <p:ext uri="{386F3935-93C4-4BCD-93E2-E3B085C9AB24}">
+                <p16:designElem xmlns:p16="http://schemas.microsoft.com/office/powerpoint/2015/main" val="1"/>
+              </p:ext>
+            </p:extLst>
+          </p:nvPr>
+        </p:nvSpPr>
+        <p:spPr>
+          <a:xfrm flipH="1">
+            <a:off x="8115299" y="-1"/>
+            <a:ext cx="4076698" cy="1590742"/>
+          </a:xfrm>
+          <a:prstGeom prst="rect">
+            <a:avLst/>
+          </a:prstGeom>
+          <a:gradFill>
+            <a:gsLst>
+              <a:gs pos="0">
+                <a:schemeClr val="accent1">
+                  <a:alpha val="66000"/>
+                </a:schemeClr>
+              </a:gs>
+              <a:gs pos="100000">
+                <a:srgbClr val="000000">
+                  <a:alpha val="30000"/>
+                </a:srgbClr>
+              </a:gs>
+            </a:gsLst>
+            <a:lin ang="13200000" scaled="0"/>
+          </a:gradFill>
+          <a:ln>
+            <a:noFill/>
+          </a:ln>
+        </p:spPr>
+        <p:style>
+          <a:lnRef idx="2">
+            <a:schemeClr val="accent1">
+              <a:shade val="50000"/>
+            </a:schemeClr>
+          </a:lnRef>
+          <a:fillRef idx="1">
+            <a:schemeClr val="accent1"/>
+          </a:fillRef>
+          <a:effectRef idx="0">
+            <a:schemeClr val="accent1"/>
+          </a:effectRef>
+          <a:fontRef idx="minor">
+            <a:schemeClr val="lt1"/>
+          </a:fontRef>
+        </p:style>
+        <p:txBody>
+          <a:bodyPr rtlCol="0" anchor="ctr"/>
+          <a:lstStyle/>
+          <a:p>
+            <a:pPr algn="ctr"/>
+            <a:endParaRPr lang="en-US"/>
+          </a:p>
+        </p:txBody>
+      </p:sp>
+      <p:sp>
+        <p:nvSpPr>
+          <p:cNvPr id="33" name="Rectangle 32">
+            <a:extLst>
+              <a:ext uri="{FF2B5EF4-FFF2-40B4-BE49-F238E27FC236}">
+                <a16:creationId xmlns:a16="http://schemas.microsoft.com/office/drawing/2014/main" id="{32DA8C53-A11B-11DB-4BD2-D48A4DF05834}"/>
+              </a:ext>
+              <a:ext uri="{C183D7F6-B498-43B3-948B-1728B52AA6E4}">
+                <adec:decorative xmlns:adec="http://schemas.microsoft.com/office/drawing/2017/decorative" val="1"/>
+              </a:ext>
+            </a:extLst>
+          </p:cNvPr>
+          <p:cNvSpPr>
+            <a:spLocks noGrp="1" noRot="1" noChangeAspect="1" noMove="1" noResize="1" noEditPoints="1" noAdjustHandles="1" noChangeArrowheads="1" noChangeShapeType="1" noTextEdit="1"/>
+          </p:cNvSpPr>
+          <p:nvPr>
+            <p:extLst>
+              <p:ext uri="{386F3935-93C4-4BCD-93E2-E3B085C9AB24}">
+                <p16:designElem xmlns:p16="http://schemas.microsoft.com/office/powerpoint/2015/main" val="1"/>
+              </p:ext>
+            </p:extLst>
+          </p:nvPr>
+        </p:nvSpPr>
+        <p:spPr>
+          <a:xfrm>
+            <a:off x="459350" y="-1"/>
+            <a:ext cx="11732646" cy="1597433"/>
+          </a:xfrm>
+          <a:prstGeom prst="rect">
+            <a:avLst/>
+          </a:prstGeom>
+          <a:gradFill>
+            <a:gsLst>
+              <a:gs pos="50000">
+                <a:srgbClr val="000000">
+                  <a:alpha val="0"/>
+                </a:srgbClr>
+              </a:gs>
+              <a:gs pos="99000">
+                <a:schemeClr val="accent1">
+                  <a:lumMod val="50000"/>
+                  <a:alpha val="52000"/>
+                </a:schemeClr>
+              </a:gs>
+            </a:gsLst>
+            <a:lin ang="16800000" scaled="0"/>
+          </a:gradFill>
+          <a:ln>
+            <a:noFill/>
+          </a:ln>
+        </p:spPr>
+        <p:style>
+          <a:lnRef idx="2">
+            <a:schemeClr val="accent1">
+              <a:shade val="50000"/>
+            </a:schemeClr>
+          </a:lnRef>
+          <a:fillRef idx="1">
+            <a:schemeClr val="accent1"/>
+          </a:fillRef>
+          <a:effectRef idx="0">
+            <a:schemeClr val="accent1"/>
+          </a:effectRef>
+          <a:fontRef idx="minor">
+            <a:schemeClr val="lt1"/>
+          </a:fontRef>
+        </p:style>
+        <p:txBody>
+          <a:bodyPr rtlCol="0" anchor="ctr"/>
+          <a:lstStyle/>
+          <a:p>
+            <a:pPr algn="ctr"/>
+            <a:endParaRPr lang="en-US"/>
+          </a:p>
+        </p:txBody>
+      </p:sp>
+      <p:sp>
+        <p:nvSpPr>
+          <p:cNvPr id="2" name="Title 1">
+            <a:extLst>
+              <a:ext uri="{FF2B5EF4-FFF2-40B4-BE49-F238E27FC236}">
+                <a16:creationId xmlns:a16="http://schemas.microsoft.com/office/drawing/2014/main" id="{EDADF542-F7D5-DCAD-066E-F69F26F8A4A5}"/>
+              </a:ext>
+            </a:extLst>
+          </p:cNvPr>
+          <p:cNvSpPr>
+            <a:spLocks noGrp="1"/>
+          </p:cNvSpPr>
+          <p:nvPr>
+            <p:ph type="title"/>
+          </p:nvPr>
+        </p:nvSpPr>
+        <p:spPr>
+          <a:xfrm>
+            <a:off x="1371599" y="294538"/>
+            <a:ext cx="9895951" cy="1033669"/>
+          </a:xfrm>
+        </p:spPr>
+        <p:txBody>
+          <a:bodyPr>
+            <a:normAutofit/>
+          </a:bodyPr>
+          <a:lstStyle/>
+          <a:p>
+            <a:r>
+              <a:rPr lang="en-US" sz="4000">
+                <a:solidFill>
+                  <a:srgbClr val="FFFFFF"/>
+                </a:solidFill>
+              </a:rPr>
+              <a:t>Shadows &amp; Filters</a:t>
+            </a:r>
+          </a:p>
+        </p:txBody>
+      </p:sp>
+      <p:pic>
+        <p:nvPicPr>
+          <p:cNvPr id="6146" name="Picture 2" descr="Lightbox">
+            <a:extLst>
+              <a:ext uri="{FF2B5EF4-FFF2-40B4-BE49-F238E27FC236}">
+                <a16:creationId xmlns:a16="http://schemas.microsoft.com/office/drawing/2014/main" id="{D51A198E-349A-E769-1B33-736FF033F060}"/>
+              </a:ext>
+            </a:extLst>
+          </p:cNvPr>
+          <p:cNvPicPr>
+            <a:picLocks noChangeAspect="1" noChangeArrowheads="1"/>
+          </p:cNvPicPr>
+          <p:nvPr/>
+        </p:nvPicPr>
+        <p:blipFill>
+          <a:blip r:embed="rId2">
+            <a:extLst>
+              <a:ext uri="{28A0092B-C50C-407E-A947-70E740481C1C}">
+                <a14:useLocalDpi xmlns:a14="http://schemas.microsoft.com/office/drawing/2010/main" val="0"/>
+              </a:ext>
+            </a:extLst>
+          </a:blip>
+          <a:srcRect/>
+          <a:stretch>
+            <a:fillRect/>
+          </a:stretch>
+        </p:blipFill>
+        <p:spPr bwMode="auto">
+          <a:xfrm>
+            <a:off x="2165350" y="1885279"/>
+            <a:ext cx="6764903" cy="4141624"/>
+          </a:xfrm>
+          <a:prstGeom prst="rect">
+            <a:avLst/>
+          </a:prstGeom>
+          <a:noFill/>
+          <a:extLst>
+            <a:ext uri="{909E8E84-426E-40DD-AFC4-6F175D3DCCD1}">
+              <a14:hiddenFill xmlns:a14="http://schemas.microsoft.com/office/drawing/2010/main">
+                <a:solidFill>
+                  <a:srgbClr val="FFFFFF"/>
+                </a:solidFill>
+              </a14:hiddenFill>
+            </a:ext>
+          </a:extLst>
+        </p:spPr>
+      </p:pic>
+      <p:sp>
+        <p:nvSpPr>
+          <p:cNvPr id="4" name="Footer Placeholder 3">
+            <a:extLst>
+              <a:ext uri="{FF2B5EF4-FFF2-40B4-BE49-F238E27FC236}">
+                <a16:creationId xmlns:a16="http://schemas.microsoft.com/office/drawing/2014/main" id="{20ECA424-8C36-EF68-558F-58EFFE4029E7}"/>
+              </a:ext>
+            </a:extLst>
+          </p:cNvPr>
+          <p:cNvSpPr>
+            <a:spLocks noGrp="1"/>
+          </p:cNvSpPr>
+          <p:nvPr>
+            <p:ph type="ftr" sz="quarter" idx="11"/>
+          </p:nvPr>
+        </p:nvSpPr>
+        <p:spPr/>
+        <p:txBody>
+          <a:bodyPr/>
+          <a:lstStyle/>
+          <a:p>
+            <a:r>
+              <a:rPr lang="en-US"/>
+              <a:t>https://www.geeksforgeeks.org/css/understanding-css-shadows-box-shadow-vs-drop-shadow/</a:t>
+            </a:r>
+          </a:p>
+        </p:txBody>
+      </p:sp>
+    </p:spTree>
+    <p:extLst>
+      <p:ext uri="{BB962C8B-B14F-4D97-AF65-F5344CB8AC3E}">
+        <p14:creationId xmlns:p14="http://schemas.microsoft.com/office/powerpoint/2010/main" val="2892638854"/>
+      </p:ext>
+    </p:extLst>
+  </p:cSld>
+  <p:clrMapOvr>
+    <a:masterClrMapping/>
+  </p:clrMapOvr>
+</p:sld>
+</file>
+
+<file path=ppt/slides/slide32.xml><?xml version="1.0" encoding="utf-8"?>
+<p:sld xmlns:a="http://schemas.openxmlformats.org/drawingml/2006/main" xmlns:r="http://schemas.openxmlformats.org/officeDocument/2006/relationships" xmlns:p="http://schemas.openxmlformats.org/presentationml/2006/main">
+  <p:cSld>
+    <p:bg>
+      <p:bgPr>
+        <a:solidFill>
+          <a:schemeClr val="bg1"/>
+        </a:solidFill>
+        <a:effectLst/>
+      </p:bgPr>
+    </p:bg>
+    <p:spTree>
+      <p:nvGrpSpPr>
+        <p:cNvPr id="1" name="">
+          <a:extLst>
+            <a:ext uri="{FF2B5EF4-FFF2-40B4-BE49-F238E27FC236}">
               <a16:creationId xmlns:a16="http://schemas.microsoft.com/office/drawing/2014/main" id="{72AD0A78-69B8-1653-D28E-4269C347DD75}"/>
             </a:ext>
           </a:extLst>
@@ -28283,540 +28817,6 @@
     <p:extLst>
       <p:ext uri="{BB962C8B-B14F-4D97-AF65-F5344CB8AC3E}">
         <p14:creationId xmlns:p14="http://schemas.microsoft.com/office/powerpoint/2010/main" val="2287963533"/>
-      </p:ext>
-    </p:extLst>
-  </p:cSld>
-  <p:clrMapOvr>
-    <a:masterClrMapping/>
-  </p:clrMapOvr>
-</p:sld>
-</file>
-
-<file path=ppt/slides/slide32.xml><?xml version="1.0" encoding="utf-8"?>
-<p:sld xmlns:a="http://schemas.openxmlformats.org/drawingml/2006/main" xmlns:r="http://schemas.openxmlformats.org/officeDocument/2006/relationships" xmlns:p="http://schemas.openxmlformats.org/presentationml/2006/main">
-  <p:cSld>
-    <p:bg>
-      <p:bgPr>
-        <a:solidFill>
-          <a:schemeClr val="bg1"/>
-        </a:solidFill>
-        <a:effectLst/>
-      </p:bgPr>
-    </p:bg>
-    <p:spTree>
-      <p:nvGrpSpPr>
-        <p:cNvPr id="1" name="">
-          <a:extLst>
-            <a:ext uri="{FF2B5EF4-FFF2-40B4-BE49-F238E27FC236}">
-              <a16:creationId xmlns:a16="http://schemas.microsoft.com/office/drawing/2014/main" id="{C75C18E4-79BB-4DDA-9CAD-AAC1CEA36C49}"/>
-            </a:ext>
-          </a:extLst>
-        </p:cNvPr>
-        <p:cNvGrpSpPr/>
-        <p:nvPr/>
-      </p:nvGrpSpPr>
-      <p:grpSpPr>
-        <a:xfrm>
-          <a:off x="0" y="0"/>
-          <a:ext cx="0" cy="0"/>
-          <a:chOff x="0" y="0"/>
-          <a:chExt cx="0" cy="0"/>
-        </a:xfrm>
-      </p:grpSpPr>
-      <p:sp useBgFill="1">
-        <p:nvSpPr>
-          <p:cNvPr id="25" name="Rectangle 24">
-            <a:extLst>
-              <a:ext uri="{FF2B5EF4-FFF2-40B4-BE49-F238E27FC236}">
-                <a16:creationId xmlns:a16="http://schemas.microsoft.com/office/drawing/2014/main" id="{E12D2DBC-999A-DEC6-C290-BB02B5A01CFD}"/>
-              </a:ext>
-              <a:ext uri="{C183D7F6-B498-43B3-948B-1728B52AA6E4}">
-                <adec:decorative xmlns:adec="http://schemas.microsoft.com/office/drawing/2017/decorative" val="1"/>
-              </a:ext>
-            </a:extLst>
-          </p:cNvPr>
-          <p:cNvSpPr>
-            <a:spLocks noGrp="1" noRot="1" noChangeAspect="1" noMove="1" noResize="1" noEditPoints="1" noAdjustHandles="1" noChangeArrowheads="1" noChangeShapeType="1" noTextEdit="1"/>
-          </p:cNvSpPr>
-          <p:nvPr>
-            <p:extLst>
-              <p:ext uri="{386F3935-93C4-4BCD-93E2-E3B085C9AB24}">
-                <p16:designElem xmlns:p16="http://schemas.microsoft.com/office/powerpoint/2015/main" val="1"/>
-              </p:ext>
-            </p:extLst>
-          </p:nvPr>
-        </p:nvSpPr>
-        <p:spPr>
-          <a:xfrm>
-            <a:off x="0" y="0"/>
-            <a:ext cx="12192000" cy="6858000"/>
-          </a:xfrm>
-          <a:prstGeom prst="rect">
-            <a:avLst/>
-          </a:prstGeom>
-          <a:ln w="12700" cap="flat" cmpd="sng" algn="ctr">
-            <a:noFill/>
-            <a:prstDash val="solid"/>
-            <a:miter lim="800000"/>
-          </a:ln>
-          <a:effectLst/>
-          <a:extLst>
-            <a:ext uri="{91240B29-F687-4F45-9708-019B960494DF}">
-              <a14:hiddenLine xmlns:a14="http://schemas.microsoft.com/office/drawing/2010/main" w="12700" cap="flat" cmpd="sng" algn="ctr">
-                <a:solidFill>
-                  <a:schemeClr val="accent1">
-                    <a:shade val="50000"/>
-                  </a:schemeClr>
-                </a:solidFill>
-                <a:prstDash val="solid"/>
-                <a:miter lim="800000"/>
-              </a14:hiddenLine>
-            </a:ext>
-          </a:extLst>
-        </p:spPr>
-        <p:style>
-          <a:lnRef idx="2">
-            <a:schemeClr val="accent1">
-              <a:shade val="50000"/>
-            </a:schemeClr>
-          </a:lnRef>
-          <a:fillRef idx="1">
-            <a:schemeClr val="accent1"/>
-          </a:fillRef>
-          <a:effectRef idx="0">
-            <a:schemeClr val="accent1"/>
-          </a:effectRef>
-          <a:fontRef idx="minor">
-            <a:schemeClr val="lt1"/>
-          </a:fontRef>
-        </p:style>
-        <p:txBody>
-          <a:bodyPr rtlCol="0" anchor="ctr"/>
-          <a:lstStyle/>
-          <a:p>
-            <a:pPr algn="ctr"/>
-            <a:endParaRPr lang="en-US"/>
-          </a:p>
-        </p:txBody>
-      </p:sp>
-      <p:sp>
-        <p:nvSpPr>
-          <p:cNvPr id="27" name="Rectangle 26">
-            <a:extLst>
-              <a:ext uri="{FF2B5EF4-FFF2-40B4-BE49-F238E27FC236}">
-                <a16:creationId xmlns:a16="http://schemas.microsoft.com/office/drawing/2014/main" id="{3829E176-5C6C-0547-5305-463A623D15DC}"/>
-              </a:ext>
-              <a:ext uri="{C183D7F6-B498-43B3-948B-1728B52AA6E4}">
-                <adec:decorative xmlns:adec="http://schemas.microsoft.com/office/drawing/2017/decorative" val="1"/>
-              </a:ext>
-            </a:extLst>
-          </p:cNvPr>
-          <p:cNvSpPr>
-            <a:spLocks noGrp="1" noRot="1" noChangeAspect="1" noMove="1" noResize="1" noEditPoints="1" noAdjustHandles="1" noChangeArrowheads="1" noChangeShapeType="1" noTextEdit="1"/>
-          </p:cNvSpPr>
-          <p:nvPr>
-            <p:extLst>
-              <p:ext uri="{386F3935-93C4-4BCD-93E2-E3B085C9AB24}">
-                <p16:designElem xmlns:p16="http://schemas.microsoft.com/office/powerpoint/2015/main" val="1"/>
-              </p:ext>
-            </p:extLst>
-          </p:nvPr>
-        </p:nvSpPr>
-        <p:spPr>
-          <a:xfrm flipH="1">
-            <a:off x="-1" y="-1"/>
-            <a:ext cx="12191998" cy="1590742"/>
-          </a:xfrm>
-          <a:prstGeom prst="rect">
-            <a:avLst/>
-          </a:prstGeom>
-          <a:gradFill>
-            <a:gsLst>
-              <a:gs pos="0">
-                <a:srgbClr val="000000"/>
-              </a:gs>
-              <a:gs pos="100000">
-                <a:schemeClr val="accent1">
-                  <a:lumMod val="75000"/>
-                </a:schemeClr>
-              </a:gs>
-            </a:gsLst>
-            <a:lin ang="8400000" scaled="0"/>
-          </a:gradFill>
-          <a:ln>
-            <a:noFill/>
-          </a:ln>
-        </p:spPr>
-        <p:style>
-          <a:lnRef idx="2">
-            <a:schemeClr val="accent1">
-              <a:shade val="50000"/>
-            </a:schemeClr>
-          </a:lnRef>
-          <a:fillRef idx="1">
-            <a:schemeClr val="accent1"/>
-          </a:fillRef>
-          <a:effectRef idx="0">
-            <a:schemeClr val="accent1"/>
-          </a:effectRef>
-          <a:fontRef idx="minor">
-            <a:schemeClr val="lt1"/>
-          </a:fontRef>
-        </p:style>
-        <p:txBody>
-          <a:bodyPr rtlCol="0" anchor="ctr"/>
-          <a:lstStyle/>
-          <a:p>
-            <a:pPr algn="ctr"/>
-            <a:endParaRPr lang="en-US"/>
-          </a:p>
-        </p:txBody>
-      </p:sp>
-      <p:sp>
-        <p:nvSpPr>
-          <p:cNvPr id="29" name="Rectangle 28">
-            <a:extLst>
-              <a:ext uri="{FF2B5EF4-FFF2-40B4-BE49-F238E27FC236}">
-                <a16:creationId xmlns:a16="http://schemas.microsoft.com/office/drawing/2014/main" id="{BC9A17F4-79B9-E455-971E-392B53A0EF44}"/>
-              </a:ext>
-              <a:ext uri="{C183D7F6-B498-43B3-948B-1728B52AA6E4}">
-                <adec:decorative xmlns:adec="http://schemas.microsoft.com/office/drawing/2017/decorative" val="1"/>
-              </a:ext>
-            </a:extLst>
-          </p:cNvPr>
-          <p:cNvSpPr>
-            <a:spLocks noGrp="1" noRot="1" noChangeAspect="1" noMove="1" noResize="1" noEditPoints="1" noAdjustHandles="1" noChangeArrowheads="1" noChangeShapeType="1" noTextEdit="1"/>
-          </p:cNvSpPr>
-          <p:nvPr>
-            <p:extLst>
-              <p:ext uri="{386F3935-93C4-4BCD-93E2-E3B085C9AB24}">
-                <p16:designElem xmlns:p16="http://schemas.microsoft.com/office/powerpoint/2015/main" val="1"/>
-              </p:ext>
-            </p:extLst>
-          </p:nvPr>
-        </p:nvSpPr>
-        <p:spPr>
-          <a:xfrm rot="10800000" flipH="1">
-            <a:off x="-3" y="0"/>
-            <a:ext cx="8115306" cy="1590742"/>
-          </a:xfrm>
-          <a:prstGeom prst="rect">
-            <a:avLst/>
-          </a:prstGeom>
-          <a:gradFill>
-            <a:gsLst>
-              <a:gs pos="20000">
-                <a:schemeClr val="accent1">
-                  <a:alpha val="0"/>
-                </a:schemeClr>
-              </a:gs>
-              <a:gs pos="100000">
-                <a:schemeClr val="accent1">
-                  <a:lumMod val="50000"/>
-                  <a:alpha val="55000"/>
-                </a:schemeClr>
-              </a:gs>
-            </a:gsLst>
-            <a:lin ang="13800000" scaled="0"/>
-          </a:gradFill>
-          <a:ln>
-            <a:noFill/>
-          </a:ln>
-        </p:spPr>
-        <p:style>
-          <a:lnRef idx="2">
-            <a:schemeClr val="accent1">
-              <a:shade val="50000"/>
-            </a:schemeClr>
-          </a:lnRef>
-          <a:fillRef idx="1">
-            <a:schemeClr val="accent1"/>
-          </a:fillRef>
-          <a:effectRef idx="0">
-            <a:schemeClr val="accent1"/>
-          </a:effectRef>
-          <a:fontRef idx="minor">
-            <a:schemeClr val="lt1"/>
-          </a:fontRef>
-        </p:style>
-        <p:txBody>
-          <a:bodyPr rtlCol="0" anchor="ctr"/>
-          <a:lstStyle/>
-          <a:p>
-            <a:pPr algn="ctr"/>
-            <a:endParaRPr lang="en-US"/>
-          </a:p>
-        </p:txBody>
-      </p:sp>
-      <p:sp>
-        <p:nvSpPr>
-          <p:cNvPr id="31" name="Rectangle 30">
-            <a:extLst>
-              <a:ext uri="{FF2B5EF4-FFF2-40B4-BE49-F238E27FC236}">
-                <a16:creationId xmlns:a16="http://schemas.microsoft.com/office/drawing/2014/main" id="{881310BF-1672-C549-0587-7AB9CF5421B1}"/>
-              </a:ext>
-              <a:ext uri="{C183D7F6-B498-43B3-948B-1728B52AA6E4}">
-                <adec:decorative xmlns:adec="http://schemas.microsoft.com/office/drawing/2017/decorative" val="1"/>
-              </a:ext>
-            </a:extLst>
-          </p:cNvPr>
-          <p:cNvSpPr>
-            <a:spLocks noGrp="1" noRot="1" noChangeAspect="1" noMove="1" noResize="1" noEditPoints="1" noAdjustHandles="1" noChangeArrowheads="1" noChangeShapeType="1" noTextEdit="1"/>
-          </p:cNvSpPr>
-          <p:nvPr>
-            <p:extLst>
-              <p:ext uri="{386F3935-93C4-4BCD-93E2-E3B085C9AB24}">
-                <p16:designElem xmlns:p16="http://schemas.microsoft.com/office/powerpoint/2015/main" val="1"/>
-              </p:ext>
-            </p:extLst>
-          </p:nvPr>
-        </p:nvSpPr>
-        <p:spPr>
-          <a:xfrm flipH="1">
-            <a:off x="8115299" y="-1"/>
-            <a:ext cx="4076698" cy="1590742"/>
-          </a:xfrm>
-          <a:prstGeom prst="rect">
-            <a:avLst/>
-          </a:prstGeom>
-          <a:gradFill>
-            <a:gsLst>
-              <a:gs pos="0">
-                <a:schemeClr val="accent1">
-                  <a:alpha val="66000"/>
-                </a:schemeClr>
-              </a:gs>
-              <a:gs pos="100000">
-                <a:srgbClr val="000000">
-                  <a:alpha val="30000"/>
-                </a:srgbClr>
-              </a:gs>
-            </a:gsLst>
-            <a:lin ang="13200000" scaled="0"/>
-          </a:gradFill>
-          <a:ln>
-            <a:noFill/>
-          </a:ln>
-        </p:spPr>
-        <p:style>
-          <a:lnRef idx="2">
-            <a:schemeClr val="accent1">
-              <a:shade val="50000"/>
-            </a:schemeClr>
-          </a:lnRef>
-          <a:fillRef idx="1">
-            <a:schemeClr val="accent1"/>
-          </a:fillRef>
-          <a:effectRef idx="0">
-            <a:schemeClr val="accent1"/>
-          </a:effectRef>
-          <a:fontRef idx="minor">
-            <a:schemeClr val="lt1"/>
-          </a:fontRef>
-        </p:style>
-        <p:txBody>
-          <a:bodyPr rtlCol="0" anchor="ctr"/>
-          <a:lstStyle/>
-          <a:p>
-            <a:pPr algn="ctr"/>
-            <a:endParaRPr lang="en-US"/>
-          </a:p>
-        </p:txBody>
-      </p:sp>
-      <p:sp>
-        <p:nvSpPr>
-          <p:cNvPr id="33" name="Rectangle 32">
-            <a:extLst>
-              <a:ext uri="{FF2B5EF4-FFF2-40B4-BE49-F238E27FC236}">
-                <a16:creationId xmlns:a16="http://schemas.microsoft.com/office/drawing/2014/main" id="{32DA8C53-A11B-11DB-4BD2-D48A4DF05834}"/>
-              </a:ext>
-              <a:ext uri="{C183D7F6-B498-43B3-948B-1728B52AA6E4}">
-                <adec:decorative xmlns:adec="http://schemas.microsoft.com/office/drawing/2017/decorative" val="1"/>
-              </a:ext>
-            </a:extLst>
-          </p:cNvPr>
-          <p:cNvSpPr>
-            <a:spLocks noGrp="1" noRot="1" noChangeAspect="1" noMove="1" noResize="1" noEditPoints="1" noAdjustHandles="1" noChangeArrowheads="1" noChangeShapeType="1" noTextEdit="1"/>
-          </p:cNvSpPr>
-          <p:nvPr>
-            <p:extLst>
-              <p:ext uri="{386F3935-93C4-4BCD-93E2-E3B085C9AB24}">
-                <p16:designElem xmlns:p16="http://schemas.microsoft.com/office/powerpoint/2015/main" val="1"/>
-              </p:ext>
-            </p:extLst>
-          </p:nvPr>
-        </p:nvSpPr>
-        <p:spPr>
-          <a:xfrm>
-            <a:off x="459350" y="-1"/>
-            <a:ext cx="11732646" cy="1597433"/>
-          </a:xfrm>
-          <a:prstGeom prst="rect">
-            <a:avLst/>
-          </a:prstGeom>
-          <a:gradFill>
-            <a:gsLst>
-              <a:gs pos="50000">
-                <a:srgbClr val="000000">
-                  <a:alpha val="0"/>
-                </a:srgbClr>
-              </a:gs>
-              <a:gs pos="99000">
-                <a:schemeClr val="accent1">
-                  <a:lumMod val="50000"/>
-                  <a:alpha val="52000"/>
-                </a:schemeClr>
-              </a:gs>
-            </a:gsLst>
-            <a:lin ang="16800000" scaled="0"/>
-          </a:gradFill>
-          <a:ln>
-            <a:noFill/>
-          </a:ln>
-        </p:spPr>
-        <p:style>
-          <a:lnRef idx="2">
-            <a:schemeClr val="accent1">
-              <a:shade val="50000"/>
-            </a:schemeClr>
-          </a:lnRef>
-          <a:fillRef idx="1">
-            <a:schemeClr val="accent1"/>
-          </a:fillRef>
-          <a:effectRef idx="0">
-            <a:schemeClr val="accent1"/>
-          </a:effectRef>
-          <a:fontRef idx="minor">
-            <a:schemeClr val="lt1"/>
-          </a:fontRef>
-        </p:style>
-        <p:txBody>
-          <a:bodyPr rtlCol="0" anchor="ctr"/>
-          <a:lstStyle/>
-          <a:p>
-            <a:pPr algn="ctr"/>
-            <a:endParaRPr lang="en-US"/>
-          </a:p>
-        </p:txBody>
-      </p:sp>
-      <p:sp>
-        <p:nvSpPr>
-          <p:cNvPr id="2" name="Title 1">
-            <a:extLst>
-              <a:ext uri="{FF2B5EF4-FFF2-40B4-BE49-F238E27FC236}">
-                <a16:creationId xmlns:a16="http://schemas.microsoft.com/office/drawing/2014/main" id="{EDADF542-F7D5-DCAD-066E-F69F26F8A4A5}"/>
-              </a:ext>
-            </a:extLst>
-          </p:cNvPr>
-          <p:cNvSpPr>
-            <a:spLocks noGrp="1"/>
-          </p:cNvSpPr>
-          <p:nvPr>
-            <p:ph type="title"/>
-          </p:nvPr>
-        </p:nvSpPr>
-        <p:spPr>
-          <a:xfrm>
-            <a:off x="1371599" y="294538"/>
-            <a:ext cx="9895951" cy="1033669"/>
-          </a:xfrm>
-        </p:spPr>
-        <p:txBody>
-          <a:bodyPr>
-            <a:normAutofit/>
-          </a:bodyPr>
-          <a:lstStyle/>
-          <a:p>
-            <a:r>
-              <a:rPr lang="en-US" sz="4000">
-                <a:solidFill>
-                  <a:srgbClr val="FFFFFF"/>
-                </a:solidFill>
-              </a:rPr>
-              <a:t>Shadows &amp; Filters</a:t>
-            </a:r>
-          </a:p>
-        </p:txBody>
-      </p:sp>
-      <p:pic>
-        <p:nvPicPr>
-          <p:cNvPr id="6146" name="Picture 2" descr="Lightbox">
-            <a:extLst>
-              <a:ext uri="{FF2B5EF4-FFF2-40B4-BE49-F238E27FC236}">
-                <a16:creationId xmlns:a16="http://schemas.microsoft.com/office/drawing/2014/main" id="{D51A198E-349A-E769-1B33-736FF033F060}"/>
-              </a:ext>
-            </a:extLst>
-          </p:cNvPr>
-          <p:cNvPicPr>
-            <a:picLocks noChangeAspect="1" noChangeArrowheads="1"/>
-          </p:cNvPicPr>
-          <p:nvPr/>
-        </p:nvPicPr>
-        <p:blipFill>
-          <a:blip r:embed="rId2">
-            <a:extLst>
-              <a:ext uri="{28A0092B-C50C-407E-A947-70E740481C1C}">
-                <a14:useLocalDpi xmlns:a14="http://schemas.microsoft.com/office/drawing/2010/main" val="0"/>
-              </a:ext>
-            </a:extLst>
-          </a:blip>
-          <a:srcRect/>
-          <a:stretch>
-            <a:fillRect/>
-          </a:stretch>
-        </p:blipFill>
-        <p:spPr bwMode="auto">
-          <a:xfrm>
-            <a:off x="2165350" y="1885279"/>
-            <a:ext cx="6764903" cy="4141624"/>
-          </a:xfrm>
-          <a:prstGeom prst="rect">
-            <a:avLst/>
-          </a:prstGeom>
-          <a:noFill/>
-          <a:extLst>
-            <a:ext uri="{909E8E84-426E-40DD-AFC4-6F175D3DCCD1}">
-              <a14:hiddenFill xmlns:a14="http://schemas.microsoft.com/office/drawing/2010/main">
-                <a:solidFill>
-                  <a:srgbClr val="FFFFFF"/>
-                </a:solidFill>
-              </a14:hiddenFill>
-            </a:ext>
-          </a:extLst>
-        </p:spPr>
-      </p:pic>
-      <p:sp>
-        <p:nvSpPr>
-          <p:cNvPr id="4" name="Footer Placeholder 3">
-            <a:extLst>
-              <a:ext uri="{FF2B5EF4-FFF2-40B4-BE49-F238E27FC236}">
-                <a16:creationId xmlns:a16="http://schemas.microsoft.com/office/drawing/2014/main" id="{20ECA424-8C36-EF68-558F-58EFFE4029E7}"/>
-              </a:ext>
-            </a:extLst>
-          </p:cNvPr>
-          <p:cNvSpPr>
-            <a:spLocks noGrp="1"/>
-          </p:cNvSpPr>
-          <p:nvPr>
-            <p:ph type="ftr" sz="quarter" idx="11"/>
-          </p:nvPr>
-        </p:nvSpPr>
-        <p:spPr/>
-        <p:txBody>
-          <a:bodyPr/>
-          <a:lstStyle/>
-          <a:p>
-            <a:r>
-              <a:rPr lang="en-US"/>
-              <a:t>https://www.geeksforgeeks.org/css/understanding-css-shadows-box-shadow-vs-drop-shadow/</a:t>
-            </a:r>
-          </a:p>
-        </p:txBody>
-      </p:sp>
-    </p:spTree>
-    <p:extLst>
-      <p:ext uri="{BB962C8B-B14F-4D97-AF65-F5344CB8AC3E}">
-        <p14:creationId xmlns:p14="http://schemas.microsoft.com/office/powerpoint/2010/main" val="2892638854"/>
       </p:ext>
     </p:extLst>
   </p:cSld>

</xml_diff>